<commit_message>
Fixed some exercises and added more on the linear solvers
</commit_message>
<xml_diff>
--- a/chapters/nlin/html/fig-nlin/figs.pptx
+++ b/chapters/nlin/html/fig-nlin/figs.pptx
@@ -7,12 +7,13 @@
   <p:sldIdLst>
     <p:sldId id="256" r:id="rId2"/>
     <p:sldId id="257" r:id="rId3"/>
-    <p:sldId id="258" r:id="rId4"/>
-    <p:sldId id="261" r:id="rId5"/>
-    <p:sldId id="259" r:id="rId6"/>
-    <p:sldId id="260" r:id="rId7"/>
-    <p:sldId id="262" r:id="rId8"/>
-    <p:sldId id="263" r:id="rId9"/>
+    <p:sldId id="264" r:id="rId4"/>
+    <p:sldId id="258" r:id="rId5"/>
+    <p:sldId id="261" r:id="rId6"/>
+    <p:sldId id="259" r:id="rId7"/>
+    <p:sldId id="260" r:id="rId8"/>
+    <p:sldId id="262" r:id="rId9"/>
+    <p:sldId id="263" r:id="rId10"/>
   </p:sldIdLst>
   <p:sldSz cx="12192000" cy="6858000"/>
   <p:notesSz cx="6858000" cy="9144000"/>
@@ -277,7 +278,7 @@
           <a:p>
             <a:fld id="{5F71217C-EFC1-8A48-BDA0-9BB3AFE3A04F}" type="datetimeFigureOut">
               <a:rPr lang="en-US" smtClean="0"/>
-              <a:t>10/30/19</a:t>
+              <a:t>9/16/2020</a:t>
             </a:fld>
             <a:endParaRPr lang="en-US"/>
           </a:p>
@@ -475,7 +476,7 @@
           <a:p>
             <a:fld id="{5F71217C-EFC1-8A48-BDA0-9BB3AFE3A04F}" type="datetimeFigureOut">
               <a:rPr lang="en-US" smtClean="0"/>
-              <a:t>10/30/19</a:t>
+              <a:t>9/16/2020</a:t>
             </a:fld>
             <a:endParaRPr lang="en-US"/>
           </a:p>
@@ -683,7 +684,7 @@
           <a:p>
             <a:fld id="{5F71217C-EFC1-8A48-BDA0-9BB3AFE3A04F}" type="datetimeFigureOut">
               <a:rPr lang="en-US" smtClean="0"/>
-              <a:t>10/30/19</a:t>
+              <a:t>9/16/2020</a:t>
             </a:fld>
             <a:endParaRPr lang="en-US"/>
           </a:p>
@@ -881,7 +882,7 @@
           <a:p>
             <a:fld id="{5F71217C-EFC1-8A48-BDA0-9BB3AFE3A04F}" type="datetimeFigureOut">
               <a:rPr lang="en-US" smtClean="0"/>
-              <a:t>10/30/19</a:t>
+              <a:t>9/16/2020</a:t>
             </a:fld>
             <a:endParaRPr lang="en-US"/>
           </a:p>
@@ -1156,7 +1157,7 @@
           <a:p>
             <a:fld id="{5F71217C-EFC1-8A48-BDA0-9BB3AFE3A04F}" type="datetimeFigureOut">
               <a:rPr lang="en-US" smtClean="0"/>
-              <a:t>10/30/19</a:t>
+              <a:t>9/16/2020</a:t>
             </a:fld>
             <a:endParaRPr lang="en-US"/>
           </a:p>
@@ -1421,7 +1422,7 @@
           <a:p>
             <a:fld id="{5F71217C-EFC1-8A48-BDA0-9BB3AFE3A04F}" type="datetimeFigureOut">
               <a:rPr lang="en-US" smtClean="0"/>
-              <a:t>10/30/19</a:t>
+              <a:t>9/16/2020</a:t>
             </a:fld>
             <a:endParaRPr lang="en-US"/>
           </a:p>
@@ -1833,7 +1834,7 @@
           <a:p>
             <a:fld id="{5F71217C-EFC1-8A48-BDA0-9BB3AFE3A04F}" type="datetimeFigureOut">
               <a:rPr lang="en-US" smtClean="0"/>
-              <a:t>10/30/19</a:t>
+              <a:t>9/16/2020</a:t>
             </a:fld>
             <a:endParaRPr lang="en-US"/>
           </a:p>
@@ -1974,7 +1975,7 @@
           <a:p>
             <a:fld id="{5F71217C-EFC1-8A48-BDA0-9BB3AFE3A04F}" type="datetimeFigureOut">
               <a:rPr lang="en-US" smtClean="0"/>
-              <a:t>10/30/19</a:t>
+              <a:t>9/16/2020</a:t>
             </a:fld>
             <a:endParaRPr lang="en-US"/>
           </a:p>
@@ -2087,7 +2088,7 @@
           <a:p>
             <a:fld id="{5F71217C-EFC1-8A48-BDA0-9BB3AFE3A04F}" type="datetimeFigureOut">
               <a:rPr lang="en-US" smtClean="0"/>
-              <a:t>10/30/19</a:t>
+              <a:t>9/16/2020</a:t>
             </a:fld>
             <a:endParaRPr lang="en-US"/>
           </a:p>
@@ -2398,7 +2399,7 @@
           <a:p>
             <a:fld id="{5F71217C-EFC1-8A48-BDA0-9BB3AFE3A04F}" type="datetimeFigureOut">
               <a:rPr lang="en-US" smtClean="0"/>
-              <a:t>10/30/19</a:t>
+              <a:t>9/16/2020</a:t>
             </a:fld>
             <a:endParaRPr lang="en-US"/>
           </a:p>
@@ -2686,7 +2687,7 @@
           <a:p>
             <a:fld id="{5F71217C-EFC1-8A48-BDA0-9BB3AFE3A04F}" type="datetimeFigureOut">
               <a:rPr lang="en-US" smtClean="0"/>
-              <a:t>10/30/19</a:t>
+              <a:t>9/16/2020</a:t>
             </a:fld>
             <a:endParaRPr lang="en-US"/>
           </a:p>
@@ -2927,7 +2928,7 @@
           <a:p>
             <a:fld id="{5F71217C-EFC1-8A48-BDA0-9BB3AFE3A04F}" type="datetimeFigureOut">
               <a:rPr lang="en-US" smtClean="0"/>
-              <a:t>10/30/19</a:t>
+              <a:t>9/16/2020</a:t>
             </a:fld>
             <a:endParaRPr lang="en-US"/>
           </a:p>
@@ -4676,6 +4677,1197 @@
       </p:grpSpPr>
       <p:grpSp>
         <p:nvGrpSpPr>
+          <p:cNvPr id="34" name="Group 33">
+            <a:extLst>
+              <a:ext uri="{FF2B5EF4-FFF2-40B4-BE49-F238E27FC236}">
+                <a16:creationId xmlns:a16="http://schemas.microsoft.com/office/drawing/2014/main" id="{9E3C0EC4-2504-4BBD-AE17-F51DBABA5590}"/>
+              </a:ext>
+            </a:extLst>
+          </p:cNvPr>
+          <p:cNvGrpSpPr/>
+          <p:nvPr/>
+        </p:nvGrpSpPr>
+        <p:grpSpPr>
+          <a:xfrm>
+            <a:off x="1672590" y="1259331"/>
+            <a:ext cx="7411974" cy="4887214"/>
+            <a:chOff x="1661704" y="1270217"/>
+            <a:chExt cx="7411974" cy="4887214"/>
+          </a:xfrm>
+        </p:grpSpPr>
+        <p:grpSp>
+          <p:nvGrpSpPr>
+            <p:cNvPr id="56" name="Group 55">
+              <a:extLst>
+                <a:ext uri="{FF2B5EF4-FFF2-40B4-BE49-F238E27FC236}">
+                  <a16:creationId xmlns:a16="http://schemas.microsoft.com/office/drawing/2014/main" id="{F182E0FB-DADD-0646-8EDC-DA9691918C8E}"/>
+                </a:ext>
+              </a:extLst>
+            </p:cNvPr>
+            <p:cNvGrpSpPr/>
+            <p:nvPr/>
+          </p:nvGrpSpPr>
+          <p:grpSpPr>
+            <a:xfrm>
+              <a:off x="1661704" y="1270217"/>
+              <a:ext cx="7411974" cy="4887214"/>
+              <a:chOff x="1748790" y="1270217"/>
+              <a:chExt cx="7411974" cy="4887214"/>
+            </a:xfrm>
+          </p:grpSpPr>
+          <p:pic>
+            <p:nvPicPr>
+              <p:cNvPr id="12" name="Picture 11">
+                <a:extLst>
+                  <a:ext uri="{FF2B5EF4-FFF2-40B4-BE49-F238E27FC236}">
+                    <a16:creationId xmlns:a16="http://schemas.microsoft.com/office/drawing/2014/main" id="{331B931D-7623-4E48-94B7-2D4043563657}"/>
+                  </a:ext>
+                </a:extLst>
+              </p:cNvPr>
+              <p:cNvPicPr>
+                <a:picLocks noChangeAspect="1"/>
+              </p:cNvPicPr>
+              <p:nvPr/>
+            </p:nvPicPr>
+            <p:blipFill>
+              <a:blip r:embed="rId2"/>
+              <a:stretch>
+                <a:fillRect/>
+              </a:stretch>
+            </p:blipFill>
+            <p:spPr>
+              <a:xfrm>
+                <a:off x="1748790" y="1270217"/>
+                <a:ext cx="7411974" cy="4887214"/>
+              </a:xfrm>
+              <a:prstGeom prst="rect">
+                <a:avLst/>
+              </a:prstGeom>
+            </p:spPr>
+          </p:pic>
+          <p:sp>
+            <p:nvSpPr>
+              <p:cNvPr id="13" name="Oval 12">
+                <a:extLst>
+                  <a:ext uri="{FF2B5EF4-FFF2-40B4-BE49-F238E27FC236}">
+                    <a16:creationId xmlns:a16="http://schemas.microsoft.com/office/drawing/2014/main" id="{C29C2458-5BE2-0744-A807-9D44721A181F}"/>
+                  </a:ext>
+                </a:extLst>
+              </p:cNvPr>
+              <p:cNvSpPr>
+                <a:spLocks noChangeAspect="1"/>
+              </p:cNvSpPr>
+              <p:nvPr/>
+            </p:nvSpPr>
+            <p:spPr>
+              <a:xfrm>
+                <a:off x="5313277" y="4014636"/>
+                <a:ext cx="144000" cy="144000"/>
+              </a:xfrm>
+              <a:prstGeom prst="ellipse">
+                <a:avLst/>
+              </a:prstGeom>
+              <a:solidFill>
+                <a:srgbClr val="FF0000"/>
+              </a:solidFill>
+            </p:spPr>
+            <p:style>
+              <a:lnRef idx="2">
+                <a:schemeClr val="accent1">
+                  <a:shade val="50000"/>
+                </a:schemeClr>
+              </a:lnRef>
+              <a:fillRef idx="1">
+                <a:schemeClr val="accent1"/>
+              </a:fillRef>
+              <a:effectRef idx="0">
+                <a:schemeClr val="accent1"/>
+              </a:effectRef>
+              <a:fontRef idx="minor">
+                <a:schemeClr val="lt1"/>
+              </a:fontRef>
+            </p:style>
+            <p:txBody>
+              <a:bodyPr rtlCol="0" anchor="ctr"/>
+              <a:lstStyle/>
+              <a:p>
+                <a:pPr algn="ctr"/>
+                <a:endParaRPr lang="en-US" dirty="0"/>
+              </a:p>
+            </p:txBody>
+          </p:sp>
+          <p:grpSp>
+            <p:nvGrpSpPr>
+              <p:cNvPr id="2" name="Group 1">
+                <a:extLst>
+                  <a:ext uri="{FF2B5EF4-FFF2-40B4-BE49-F238E27FC236}">
+                    <a16:creationId xmlns:a16="http://schemas.microsoft.com/office/drawing/2014/main" id="{2856F749-4E27-F94F-A068-20D7A1A2E7BE}"/>
+                  </a:ext>
+                </a:extLst>
+              </p:cNvPr>
+              <p:cNvGrpSpPr/>
+              <p:nvPr/>
+            </p:nvGrpSpPr>
+            <p:grpSpPr>
+              <a:xfrm>
+                <a:off x="7434834" y="2038904"/>
+                <a:ext cx="1340801" cy="338554"/>
+                <a:chOff x="7523020" y="1236370"/>
+                <a:chExt cx="1340801" cy="338554"/>
+              </a:xfrm>
+            </p:grpSpPr>
+            <p:sp>
+              <p:nvSpPr>
+                <p:cNvPr id="38" name="TextBox 37">
+                  <a:extLst>
+                    <a:ext uri="{FF2B5EF4-FFF2-40B4-BE49-F238E27FC236}">
+                      <a16:creationId xmlns:a16="http://schemas.microsoft.com/office/drawing/2014/main" id="{842F1DC3-A692-B24C-B74E-ADFA4533544C}"/>
+                    </a:ext>
+                  </a:extLst>
+                </p:cNvPr>
+                <p:cNvSpPr txBox="1"/>
+                <p:nvPr/>
+              </p:nvSpPr>
+              <p:spPr>
+                <a:xfrm>
+                  <a:off x="7523020" y="1236370"/>
+                  <a:ext cx="1340801" cy="338554"/>
+                </a:xfrm>
+                <a:prstGeom prst="rect">
+                  <a:avLst/>
+                </a:prstGeom>
+                <a:noFill/>
+                <a:ln>
+                  <a:solidFill>
+                    <a:schemeClr val="tx1"/>
+                  </a:solidFill>
+                </a:ln>
+              </p:spPr>
+              <p:txBody>
+                <a:bodyPr wrap="square" rtlCol="0">
+                  <a:spAutoFit/>
+                </a:bodyPr>
+                <a:lstStyle/>
+                <a:p>
+                  <a:r>
+                    <a:rPr lang="en-US" sz="1600" dirty="0"/>
+                    <a:t>     The root</a:t>
+                  </a:r>
+                </a:p>
+              </p:txBody>
+            </p:sp>
+            <p:sp>
+              <p:nvSpPr>
+                <p:cNvPr id="36" name="Oval 35">
+                  <a:extLst>
+                    <a:ext uri="{FF2B5EF4-FFF2-40B4-BE49-F238E27FC236}">
+                      <a16:creationId xmlns:a16="http://schemas.microsoft.com/office/drawing/2014/main" id="{23DD307A-2F74-EC47-9C79-D3370032E2FB}"/>
+                    </a:ext>
+                  </a:extLst>
+                </p:cNvPr>
+                <p:cNvSpPr>
+                  <a:spLocks noChangeAspect="1"/>
+                </p:cNvSpPr>
+                <p:nvPr/>
+              </p:nvSpPr>
+              <p:spPr>
+                <a:xfrm>
+                  <a:off x="7621639" y="1333521"/>
+                  <a:ext cx="144000" cy="144000"/>
+                </a:xfrm>
+                <a:prstGeom prst="ellipse">
+                  <a:avLst/>
+                </a:prstGeom>
+                <a:solidFill>
+                  <a:srgbClr val="FF0000"/>
+                </a:solidFill>
+              </p:spPr>
+              <p:style>
+                <a:lnRef idx="2">
+                  <a:schemeClr val="accent1">
+                    <a:shade val="50000"/>
+                  </a:schemeClr>
+                </a:lnRef>
+                <a:fillRef idx="1">
+                  <a:schemeClr val="accent1"/>
+                </a:fillRef>
+                <a:effectRef idx="0">
+                  <a:schemeClr val="accent1"/>
+                </a:effectRef>
+                <a:fontRef idx="minor">
+                  <a:schemeClr val="lt1"/>
+                </a:fontRef>
+              </p:style>
+              <p:txBody>
+                <a:bodyPr rtlCol="0" anchor="ctr"/>
+                <a:lstStyle/>
+                <a:p>
+                  <a:pPr algn="ctr"/>
+                  <a:endParaRPr lang="en-US" dirty="0"/>
+                </a:p>
+              </p:txBody>
+            </p:sp>
+          </p:grpSp>
+          <p:cxnSp>
+            <p:nvCxnSpPr>
+              <p:cNvPr id="4" name="Straight Connector 3">
+                <a:extLst>
+                  <a:ext uri="{FF2B5EF4-FFF2-40B4-BE49-F238E27FC236}">
+                    <a16:creationId xmlns:a16="http://schemas.microsoft.com/office/drawing/2014/main" id="{974508CD-7C6D-D440-B11D-12C4BAD1599A}"/>
+                  </a:ext>
+                </a:extLst>
+              </p:cNvPr>
+              <p:cNvCxnSpPr>
+                <a:cxnSpLocks/>
+              </p:cNvCxnSpPr>
+              <p:nvPr/>
+            </p:nvCxnSpPr>
+            <p:spPr>
+              <a:xfrm>
+                <a:off x="3423090" y="1729993"/>
+                <a:ext cx="4953801" cy="3675426"/>
+              </a:xfrm>
+              <a:prstGeom prst="line">
+                <a:avLst/>
+              </a:prstGeom>
+              <a:ln w="28575">
+                <a:solidFill>
+                  <a:srgbClr val="00B050"/>
+                </a:solidFill>
+              </a:ln>
+            </p:spPr>
+            <p:style>
+              <a:lnRef idx="1">
+                <a:schemeClr val="dk1"/>
+              </a:lnRef>
+              <a:fillRef idx="0">
+                <a:schemeClr val="dk1"/>
+              </a:fillRef>
+              <a:effectRef idx="0">
+                <a:schemeClr val="dk1"/>
+              </a:effectRef>
+              <a:fontRef idx="minor">
+                <a:schemeClr val="tx1"/>
+              </a:fontRef>
+            </p:style>
+          </p:cxnSp>
+          <p:cxnSp>
+            <p:nvCxnSpPr>
+              <p:cNvPr id="37" name="Straight Connector 36">
+                <a:extLst>
+                  <a:ext uri="{FF2B5EF4-FFF2-40B4-BE49-F238E27FC236}">
+                    <a16:creationId xmlns:a16="http://schemas.microsoft.com/office/drawing/2014/main" id="{FE170983-D36C-A344-9DBB-8FD6DE8864CA}"/>
+                  </a:ext>
+                </a:extLst>
+              </p:cNvPr>
+              <p:cNvCxnSpPr>
+                <a:cxnSpLocks/>
+              </p:cNvCxnSpPr>
+              <p:nvPr/>
+            </p:nvCxnSpPr>
+            <p:spPr>
+              <a:xfrm>
+                <a:off x="4285479" y="3892808"/>
+                <a:ext cx="4091412" cy="1398085"/>
+              </a:xfrm>
+              <a:prstGeom prst="line">
+                <a:avLst/>
+              </a:prstGeom>
+              <a:ln w="28575">
+                <a:solidFill>
+                  <a:srgbClr val="00B0F0"/>
+                </a:solidFill>
+              </a:ln>
+            </p:spPr>
+            <p:style>
+              <a:lnRef idx="1">
+                <a:schemeClr val="dk1"/>
+              </a:lnRef>
+              <a:fillRef idx="0">
+                <a:schemeClr val="dk1"/>
+              </a:fillRef>
+              <a:effectRef idx="0">
+                <a:schemeClr val="dk1"/>
+              </a:effectRef>
+              <a:fontRef idx="minor">
+                <a:schemeClr val="tx1"/>
+              </a:fontRef>
+            </p:style>
+          </p:cxnSp>
+          <p:sp>
+            <p:nvSpPr>
+              <p:cNvPr id="40" name="TextBox 39">
+                <a:extLst>
+                  <a:ext uri="{FF2B5EF4-FFF2-40B4-BE49-F238E27FC236}">
+                    <a16:creationId xmlns:a16="http://schemas.microsoft.com/office/drawing/2014/main" id="{44737A89-EDAC-C543-B1A2-05A754EF8292}"/>
+                  </a:ext>
+                </a:extLst>
+              </p:cNvPr>
+              <p:cNvSpPr txBox="1"/>
+              <p:nvPr/>
+            </p:nvSpPr>
+            <p:spPr>
+              <a:xfrm>
+                <a:off x="4777800" y="1593901"/>
+                <a:ext cx="1620982" cy="369332"/>
+              </a:xfrm>
+              <a:prstGeom prst="rect">
+                <a:avLst/>
+              </a:prstGeom>
+              <a:noFill/>
+            </p:spPr>
+            <p:txBody>
+              <a:bodyPr wrap="square" rtlCol="0">
+                <a:spAutoFit/>
+              </a:bodyPr>
+              <a:lstStyle/>
+              <a:p>
+                <a:r>
+                  <a:rPr lang="en-US" b="1" dirty="0">
+                    <a:solidFill>
+                      <a:srgbClr val="00B050"/>
+                    </a:solidFill>
+                  </a:rPr>
+                  <a:t>1. Iteration </a:t>
+                </a:r>
+              </a:p>
+            </p:txBody>
+          </p:sp>
+          <p:sp>
+            <p:nvSpPr>
+              <p:cNvPr id="41" name="TextBox 40">
+                <a:extLst>
+                  <a:ext uri="{FF2B5EF4-FFF2-40B4-BE49-F238E27FC236}">
+                    <a16:creationId xmlns:a16="http://schemas.microsoft.com/office/drawing/2014/main" id="{33713EB3-ADCD-D947-BA28-F7CB8B14BA79}"/>
+                  </a:ext>
+                </a:extLst>
+              </p:cNvPr>
+              <p:cNvSpPr txBox="1"/>
+              <p:nvPr/>
+            </p:nvSpPr>
+            <p:spPr>
+              <a:xfrm>
+                <a:off x="4777800" y="1881492"/>
+                <a:ext cx="1620982" cy="369332"/>
+              </a:xfrm>
+              <a:prstGeom prst="rect">
+                <a:avLst/>
+              </a:prstGeom>
+              <a:noFill/>
+            </p:spPr>
+            <p:txBody>
+              <a:bodyPr wrap="square" rtlCol="0">
+                <a:spAutoFit/>
+              </a:bodyPr>
+              <a:lstStyle/>
+              <a:p>
+                <a:r>
+                  <a:rPr lang="en-US" b="1" dirty="0">
+                    <a:solidFill>
+                      <a:srgbClr val="00B0F0"/>
+                    </a:solidFill>
+                  </a:rPr>
+                  <a:t>2. Iteration </a:t>
+                </a:r>
+              </a:p>
+            </p:txBody>
+          </p:sp>
+          <p:cxnSp>
+            <p:nvCxnSpPr>
+              <p:cNvPr id="22" name="Straight Connector 21">
+                <a:extLst>
+                  <a:ext uri="{FF2B5EF4-FFF2-40B4-BE49-F238E27FC236}">
+                    <a16:creationId xmlns:a16="http://schemas.microsoft.com/office/drawing/2014/main" id="{4864E185-39A3-1649-8861-09730A703AE0}"/>
+                  </a:ext>
+                </a:extLst>
+              </p:cNvPr>
+              <p:cNvCxnSpPr>
+                <a:cxnSpLocks/>
+              </p:cNvCxnSpPr>
+              <p:nvPr/>
+            </p:nvCxnSpPr>
+            <p:spPr>
+              <a:xfrm>
+                <a:off x="3573886" y="1729993"/>
+                <a:ext cx="0" cy="2505803"/>
+              </a:xfrm>
+              <a:prstGeom prst="line">
+                <a:avLst/>
+              </a:prstGeom>
+              <a:ln w="19050">
+                <a:solidFill>
+                  <a:schemeClr val="tx1"/>
+                </a:solidFill>
+                <a:prstDash val="dash"/>
+              </a:ln>
+            </p:spPr>
+            <p:style>
+              <a:lnRef idx="1">
+                <a:schemeClr val="accent1"/>
+              </a:lnRef>
+              <a:fillRef idx="0">
+                <a:schemeClr val="accent1"/>
+              </a:fillRef>
+              <a:effectRef idx="0">
+                <a:schemeClr val="accent1"/>
+              </a:effectRef>
+              <a:fontRef idx="minor">
+                <a:schemeClr val="tx1"/>
+              </a:fontRef>
+            </p:style>
+          </p:cxnSp>
+          <p:cxnSp>
+            <p:nvCxnSpPr>
+              <p:cNvPr id="46" name="Straight Connector 45">
+                <a:extLst>
+                  <a:ext uri="{FF2B5EF4-FFF2-40B4-BE49-F238E27FC236}">
+                    <a16:creationId xmlns:a16="http://schemas.microsoft.com/office/drawing/2014/main" id="{C651B7F7-3A01-484B-A59C-BCC70C0785A0}"/>
+                  </a:ext>
+                </a:extLst>
+              </p:cNvPr>
+              <p:cNvCxnSpPr>
+                <a:cxnSpLocks/>
+              </p:cNvCxnSpPr>
+              <p:nvPr/>
+            </p:nvCxnSpPr>
+            <p:spPr>
+              <a:xfrm>
+                <a:off x="5064558" y="3748843"/>
+                <a:ext cx="0" cy="433774"/>
+              </a:xfrm>
+              <a:prstGeom prst="line">
+                <a:avLst/>
+              </a:prstGeom>
+              <a:ln w="19050">
+                <a:solidFill>
+                  <a:schemeClr val="tx1"/>
+                </a:solidFill>
+                <a:prstDash val="dash"/>
+              </a:ln>
+            </p:spPr>
+            <p:style>
+              <a:lnRef idx="1">
+                <a:schemeClr val="accent1"/>
+              </a:lnRef>
+              <a:fillRef idx="0">
+                <a:schemeClr val="accent1"/>
+              </a:fillRef>
+              <a:effectRef idx="0">
+                <a:schemeClr val="accent1"/>
+              </a:effectRef>
+              <a:fontRef idx="minor">
+                <a:schemeClr val="tx1"/>
+              </a:fontRef>
+            </p:style>
+          </p:cxnSp>
+          <p:cxnSp>
+            <p:nvCxnSpPr>
+              <p:cNvPr id="48" name="Straight Connector 47">
+                <a:extLst>
+                  <a:ext uri="{FF2B5EF4-FFF2-40B4-BE49-F238E27FC236}">
+                    <a16:creationId xmlns:a16="http://schemas.microsoft.com/office/drawing/2014/main" id="{0682DFF3-D956-8142-90E1-55D0669EC269}"/>
+                  </a:ext>
+                </a:extLst>
+              </p:cNvPr>
+              <p:cNvCxnSpPr>
+                <a:cxnSpLocks/>
+              </p:cNvCxnSpPr>
+              <p:nvPr/>
+            </p:nvCxnSpPr>
+            <p:spPr>
+              <a:xfrm>
+                <a:off x="4285479" y="3429000"/>
+                <a:ext cx="2987251" cy="1613592"/>
+              </a:xfrm>
+              <a:prstGeom prst="line">
+                <a:avLst/>
+              </a:prstGeom>
+              <a:ln w="28575">
+                <a:solidFill>
+                  <a:srgbClr val="FFC000"/>
+                </a:solidFill>
+              </a:ln>
+            </p:spPr>
+            <p:style>
+              <a:lnRef idx="1">
+                <a:schemeClr val="dk1"/>
+              </a:lnRef>
+              <a:fillRef idx="0">
+                <a:schemeClr val="dk1"/>
+              </a:fillRef>
+              <a:effectRef idx="0">
+                <a:schemeClr val="dk1"/>
+              </a:effectRef>
+              <a:fontRef idx="minor">
+                <a:schemeClr val="tx1"/>
+              </a:fontRef>
+            </p:style>
+          </p:cxnSp>
+          <p:sp>
+            <p:nvSpPr>
+              <p:cNvPr id="54" name="TextBox 53">
+                <a:extLst>
+                  <a:ext uri="{FF2B5EF4-FFF2-40B4-BE49-F238E27FC236}">
+                    <a16:creationId xmlns:a16="http://schemas.microsoft.com/office/drawing/2014/main" id="{1BA19A0E-7267-A842-A4EF-CBC6A61A0453}"/>
+                  </a:ext>
+                </a:extLst>
+              </p:cNvPr>
+              <p:cNvSpPr txBox="1"/>
+              <p:nvPr/>
+            </p:nvSpPr>
+            <p:spPr>
+              <a:xfrm>
+                <a:off x="4782487" y="2149754"/>
+                <a:ext cx="1620982" cy="369332"/>
+              </a:xfrm>
+              <a:prstGeom prst="rect">
+                <a:avLst/>
+              </a:prstGeom>
+              <a:noFill/>
+            </p:spPr>
+            <p:txBody>
+              <a:bodyPr wrap="square" rtlCol="0">
+                <a:spAutoFit/>
+              </a:bodyPr>
+              <a:lstStyle/>
+              <a:p>
+                <a:r>
+                  <a:rPr lang="en-US" b="1" dirty="0">
+                    <a:solidFill>
+                      <a:srgbClr val="FFC000"/>
+                    </a:solidFill>
+                  </a:rPr>
+                  <a:t>3. Iteration </a:t>
+                </a:r>
+              </a:p>
+            </p:txBody>
+          </p:sp>
+        </p:grpSp>
+        <p:cxnSp>
+          <p:nvCxnSpPr>
+            <p:cNvPr id="17" name="Straight Connector 16">
+              <a:extLst>
+                <a:ext uri="{FF2B5EF4-FFF2-40B4-BE49-F238E27FC236}">
+                  <a16:creationId xmlns:a16="http://schemas.microsoft.com/office/drawing/2014/main" id="{FCB6139C-DCD0-47D5-99CB-01E8037A2158}"/>
+                </a:ext>
+              </a:extLst>
+            </p:cNvPr>
+            <p:cNvCxnSpPr>
+              <a:cxnSpLocks/>
+            </p:cNvCxnSpPr>
+            <p:nvPr/>
+          </p:nvCxnSpPr>
+          <p:spPr>
+            <a:xfrm>
+              <a:off x="8018148" y="3965730"/>
+              <a:ext cx="0" cy="1354175"/>
+            </a:xfrm>
+            <a:prstGeom prst="line">
+              <a:avLst/>
+            </a:prstGeom>
+            <a:ln w="19050">
+              <a:solidFill>
+                <a:schemeClr val="tx1"/>
+              </a:solidFill>
+              <a:prstDash val="dash"/>
+            </a:ln>
+          </p:spPr>
+          <p:style>
+            <a:lnRef idx="1">
+              <a:schemeClr val="accent1"/>
+            </a:lnRef>
+            <a:fillRef idx="0">
+              <a:schemeClr val="accent1"/>
+            </a:fillRef>
+            <a:effectRef idx="0">
+              <a:schemeClr val="accent1"/>
+            </a:effectRef>
+            <a:fontRef idx="minor">
+              <a:schemeClr val="tx1"/>
+            </a:fontRef>
+          </p:style>
+        </p:cxnSp>
+        <mc:AlternateContent xmlns:mc="http://schemas.openxmlformats.org/markup-compatibility/2006">
+          <mc:Choice xmlns:a14="http://schemas.microsoft.com/office/drawing/2010/main" Requires="a14">
+            <p:sp>
+              <p:nvSpPr>
+                <p:cNvPr id="20" name="TextBox 19">
+                  <a:extLst>
+                    <a:ext uri="{FF2B5EF4-FFF2-40B4-BE49-F238E27FC236}">
+                      <a16:creationId xmlns:a16="http://schemas.microsoft.com/office/drawing/2014/main" id="{6601C426-B024-4038-9600-0C1E31C1D2B6}"/>
+                    </a:ext>
+                  </a:extLst>
+                </p:cNvPr>
+                <p:cNvSpPr txBox="1"/>
+                <p:nvPr/>
+              </p:nvSpPr>
+              <p:spPr>
+                <a:xfrm>
+                  <a:off x="3346089" y="4184699"/>
+                  <a:ext cx="281423" cy="276999"/>
+                </a:xfrm>
+                <a:prstGeom prst="rect">
+                  <a:avLst/>
+                </a:prstGeom>
+                <a:noFill/>
+              </p:spPr>
+              <p:txBody>
+                <a:bodyPr wrap="none" lIns="0" tIns="0" rIns="0" bIns="0" rtlCol="0">
+                  <a:spAutoFit/>
+                </a:bodyPr>
+                <a:lstStyle/>
+                <a:p>
+                  <a:pPr/>
+                  <a14:m>
+                    <m:oMathPara xmlns:m="http://schemas.openxmlformats.org/officeDocument/2006/math">
+                      <m:oMathParaPr>
+                        <m:jc m:val="centerGroup"/>
+                      </m:oMathParaPr>
+                      <m:oMath xmlns:m="http://schemas.openxmlformats.org/officeDocument/2006/math">
+                        <m:sSub>
+                          <m:sSubPr>
+                            <m:ctrlPr>
+                              <a:rPr lang="nb-NO" b="0" i="1" smtClean="0">
+                                <a:latin typeface="Cambria Math" panose="02040503050406030204" pitchFamily="18" charset="0"/>
+                              </a:rPr>
+                            </m:ctrlPr>
+                          </m:sSubPr>
+                          <m:e>
+                            <m:r>
+                              <a:rPr lang="nb-NO" b="0" i="1" smtClean="0">
+                                <a:latin typeface="Cambria Math" panose="02040503050406030204" pitchFamily="18" charset="0"/>
+                              </a:rPr>
+                              <m:t>𝑥</m:t>
+                            </m:r>
+                          </m:e>
+                          <m:sub>
+                            <m:r>
+                              <a:rPr lang="en-US" b="0" i="1" smtClean="0">
+                                <a:latin typeface="Cambria Math" panose="02040503050406030204" pitchFamily="18" charset="0"/>
+                              </a:rPr>
+                              <m:t>0</m:t>
+                            </m:r>
+                          </m:sub>
+                        </m:sSub>
+                      </m:oMath>
+                    </m:oMathPara>
+                  </a14:m>
+                  <a:endParaRPr lang="en-US" dirty="0"/>
+                </a:p>
+              </p:txBody>
+            </p:sp>
+          </mc:Choice>
+          <mc:Fallback>
+            <p:sp>
+              <p:nvSpPr>
+                <p:cNvPr id="20" name="TextBox 19">
+                  <a:extLst>
+                    <a:ext uri="{FF2B5EF4-FFF2-40B4-BE49-F238E27FC236}">
+                      <a16:creationId xmlns:a16="http://schemas.microsoft.com/office/drawing/2014/main" id="{6601C426-B024-4038-9600-0C1E31C1D2B6}"/>
+                    </a:ext>
+                  </a:extLst>
+                </p:cNvPr>
+                <p:cNvSpPr txBox="1">
+                  <a:spLocks noRot="1" noChangeAspect="1" noMove="1" noResize="1" noEditPoints="1" noAdjustHandles="1" noChangeArrowheads="1" noChangeShapeType="1" noTextEdit="1"/>
+                </p:cNvSpPr>
+                <p:nvPr/>
+              </p:nvSpPr>
+              <p:spPr>
+                <a:xfrm>
+                  <a:off x="3346089" y="4184699"/>
+                  <a:ext cx="281423" cy="276999"/>
+                </a:xfrm>
+                <a:prstGeom prst="rect">
+                  <a:avLst/>
+                </a:prstGeom>
+                <a:blipFill>
+                  <a:blip r:embed="rId3"/>
+                  <a:stretch>
+                    <a:fillRect l="-13043" r="-6522" b="-15556"/>
+                  </a:stretch>
+                </a:blipFill>
+              </p:spPr>
+              <p:txBody>
+                <a:bodyPr/>
+                <a:lstStyle/>
+                <a:p>
+                  <a:r>
+                    <a:rPr lang="en-US">
+                      <a:noFill/>
+                    </a:rPr>
+                    <a:t> </a:t>
+                  </a:r>
+                </a:p>
+              </p:txBody>
+            </p:sp>
+          </mc:Fallback>
+        </mc:AlternateContent>
+        <mc:AlternateContent xmlns:mc="http://schemas.openxmlformats.org/markup-compatibility/2006">
+          <mc:Choice xmlns:a14="http://schemas.microsoft.com/office/drawing/2010/main" Requires="a14">
+            <p:sp>
+              <p:nvSpPr>
+                <p:cNvPr id="21" name="TextBox 20">
+                  <a:extLst>
+                    <a:ext uri="{FF2B5EF4-FFF2-40B4-BE49-F238E27FC236}">
+                      <a16:creationId xmlns:a16="http://schemas.microsoft.com/office/drawing/2014/main" id="{6F7FB823-C0D4-4B15-8A66-B3BEFCC2CC2E}"/>
+                    </a:ext>
+                  </a:extLst>
+                </p:cNvPr>
+                <p:cNvSpPr txBox="1"/>
+                <p:nvPr/>
+              </p:nvSpPr>
+              <p:spPr>
+                <a:xfrm>
+                  <a:off x="7836784" y="3651088"/>
+                  <a:ext cx="453021" cy="276999"/>
+                </a:xfrm>
+                <a:prstGeom prst="rect">
+                  <a:avLst/>
+                </a:prstGeom>
+                <a:noFill/>
+              </p:spPr>
+              <p:txBody>
+                <a:bodyPr wrap="square" lIns="0" tIns="0" rIns="0" bIns="0" rtlCol="0">
+                  <a:spAutoFit/>
+                </a:bodyPr>
+                <a:lstStyle/>
+                <a:p>
+                  <a:pPr/>
+                  <a14:m>
+                    <m:oMathPara xmlns:m="http://schemas.openxmlformats.org/officeDocument/2006/math">
+                      <m:oMathParaPr>
+                        <m:jc m:val="centerGroup"/>
+                      </m:oMathParaPr>
+                      <m:oMath xmlns:m="http://schemas.openxmlformats.org/officeDocument/2006/math">
+                        <m:sSub>
+                          <m:sSubPr>
+                            <m:ctrlPr>
+                              <a:rPr lang="nb-NO" b="0" i="1" smtClean="0">
+                                <a:latin typeface="Cambria Math" panose="02040503050406030204" pitchFamily="18" charset="0"/>
+                              </a:rPr>
+                            </m:ctrlPr>
+                          </m:sSubPr>
+                          <m:e>
+                            <m:r>
+                              <a:rPr lang="nb-NO" b="0" i="1" smtClean="0">
+                                <a:latin typeface="Cambria Math" panose="02040503050406030204" pitchFamily="18" charset="0"/>
+                              </a:rPr>
+                              <m:t>𝑥</m:t>
+                            </m:r>
+                          </m:e>
+                          <m:sub>
+                            <m:r>
+                              <a:rPr lang="en-US" b="0" i="1" smtClean="0">
+                                <a:latin typeface="Cambria Math" panose="02040503050406030204" pitchFamily="18" charset="0"/>
+                              </a:rPr>
+                              <m:t>1</m:t>
+                            </m:r>
+                          </m:sub>
+                        </m:sSub>
+                      </m:oMath>
+                    </m:oMathPara>
+                  </a14:m>
+                  <a:endParaRPr lang="en-US" dirty="0"/>
+                </a:p>
+              </p:txBody>
+            </p:sp>
+          </mc:Choice>
+          <mc:Fallback>
+            <p:sp>
+              <p:nvSpPr>
+                <p:cNvPr id="21" name="TextBox 20">
+                  <a:extLst>
+                    <a:ext uri="{FF2B5EF4-FFF2-40B4-BE49-F238E27FC236}">
+                      <a16:creationId xmlns:a16="http://schemas.microsoft.com/office/drawing/2014/main" id="{6F7FB823-C0D4-4B15-8A66-B3BEFCC2CC2E}"/>
+                    </a:ext>
+                  </a:extLst>
+                </p:cNvPr>
+                <p:cNvSpPr txBox="1">
+                  <a:spLocks noRot="1" noChangeAspect="1" noMove="1" noResize="1" noEditPoints="1" noAdjustHandles="1" noChangeArrowheads="1" noChangeShapeType="1" noTextEdit="1"/>
+                </p:cNvSpPr>
+                <p:nvPr/>
+              </p:nvSpPr>
+              <p:spPr>
+                <a:xfrm>
+                  <a:off x="7836784" y="3651088"/>
+                  <a:ext cx="453021" cy="276999"/>
+                </a:xfrm>
+                <a:prstGeom prst="rect">
+                  <a:avLst/>
+                </a:prstGeom>
+                <a:blipFill>
+                  <a:blip r:embed="rId4"/>
+                  <a:stretch>
+                    <a:fillRect b="-15217"/>
+                  </a:stretch>
+                </a:blipFill>
+              </p:spPr>
+              <p:txBody>
+                <a:bodyPr/>
+                <a:lstStyle/>
+                <a:p>
+                  <a:r>
+                    <a:rPr lang="en-US">
+                      <a:noFill/>
+                    </a:rPr>
+                    <a:t> </a:t>
+                  </a:r>
+                </a:p>
+              </p:txBody>
+            </p:sp>
+          </mc:Fallback>
+        </mc:AlternateContent>
+        <p:cxnSp>
+          <p:nvCxnSpPr>
+            <p:cNvPr id="25" name="Straight Connector 24">
+              <a:extLst>
+                <a:ext uri="{FF2B5EF4-FFF2-40B4-BE49-F238E27FC236}">
+                  <a16:creationId xmlns:a16="http://schemas.microsoft.com/office/drawing/2014/main" id="{393EF0EE-334D-4F90-80F4-05EF5C370AA8}"/>
+                </a:ext>
+              </a:extLst>
+            </p:cNvPr>
+            <p:cNvCxnSpPr>
+              <a:cxnSpLocks/>
+            </p:cNvCxnSpPr>
+            <p:nvPr/>
+          </p:nvCxnSpPr>
+          <p:spPr>
+            <a:xfrm>
+              <a:off x="6614762" y="3965730"/>
+              <a:ext cx="0" cy="900184"/>
+            </a:xfrm>
+            <a:prstGeom prst="line">
+              <a:avLst/>
+            </a:prstGeom>
+            <a:ln w="19050">
+              <a:solidFill>
+                <a:schemeClr val="tx1"/>
+              </a:solidFill>
+              <a:prstDash val="dash"/>
+            </a:ln>
+          </p:spPr>
+          <p:style>
+            <a:lnRef idx="1">
+              <a:schemeClr val="accent1"/>
+            </a:lnRef>
+            <a:fillRef idx="0">
+              <a:schemeClr val="accent1"/>
+            </a:fillRef>
+            <a:effectRef idx="0">
+              <a:schemeClr val="accent1"/>
+            </a:effectRef>
+            <a:fontRef idx="minor">
+              <a:schemeClr val="tx1"/>
+            </a:fontRef>
+          </p:style>
+        </p:cxnSp>
+        <mc:AlternateContent xmlns:mc="http://schemas.openxmlformats.org/markup-compatibility/2006">
+          <mc:Choice xmlns:a14="http://schemas.microsoft.com/office/drawing/2010/main" Requires="a14">
+            <p:sp>
+              <p:nvSpPr>
+                <p:cNvPr id="27" name="TextBox 26">
+                  <a:extLst>
+                    <a:ext uri="{FF2B5EF4-FFF2-40B4-BE49-F238E27FC236}">
+                      <a16:creationId xmlns:a16="http://schemas.microsoft.com/office/drawing/2014/main" id="{63F61B4C-5856-47ED-9520-DDF831B132CF}"/>
+                    </a:ext>
+                  </a:extLst>
+                </p:cNvPr>
+                <p:cNvSpPr txBox="1"/>
+                <p:nvPr/>
+              </p:nvSpPr>
+              <p:spPr>
+                <a:xfrm>
+                  <a:off x="6443666" y="3615809"/>
+                  <a:ext cx="453021" cy="276999"/>
+                </a:xfrm>
+                <a:prstGeom prst="rect">
+                  <a:avLst/>
+                </a:prstGeom>
+                <a:noFill/>
+              </p:spPr>
+              <p:txBody>
+                <a:bodyPr wrap="square" lIns="0" tIns="0" rIns="0" bIns="0" rtlCol="0">
+                  <a:spAutoFit/>
+                </a:bodyPr>
+                <a:lstStyle/>
+                <a:p>
+                  <a:pPr/>
+                  <a14:m>
+                    <m:oMathPara xmlns:m="http://schemas.openxmlformats.org/officeDocument/2006/math">
+                      <m:oMathParaPr>
+                        <m:jc m:val="centerGroup"/>
+                      </m:oMathParaPr>
+                      <m:oMath xmlns:m="http://schemas.openxmlformats.org/officeDocument/2006/math">
+                        <m:sSub>
+                          <m:sSubPr>
+                            <m:ctrlPr>
+                              <a:rPr lang="nb-NO" b="0" i="1" smtClean="0">
+                                <a:latin typeface="Cambria Math" panose="02040503050406030204" pitchFamily="18" charset="0"/>
+                              </a:rPr>
+                            </m:ctrlPr>
+                          </m:sSubPr>
+                          <m:e>
+                            <m:r>
+                              <a:rPr lang="nb-NO" b="0" i="1" smtClean="0">
+                                <a:latin typeface="Cambria Math" panose="02040503050406030204" pitchFamily="18" charset="0"/>
+                              </a:rPr>
+                              <m:t>𝑥</m:t>
+                            </m:r>
+                          </m:e>
+                          <m:sub>
+                            <m:r>
+                              <a:rPr lang="en-US" b="0" i="1" smtClean="0">
+                                <a:latin typeface="Cambria Math" panose="02040503050406030204" pitchFamily="18" charset="0"/>
+                              </a:rPr>
+                              <m:t>2</m:t>
+                            </m:r>
+                          </m:sub>
+                        </m:sSub>
+                      </m:oMath>
+                    </m:oMathPara>
+                  </a14:m>
+                  <a:endParaRPr lang="en-US" dirty="0"/>
+                </a:p>
+              </p:txBody>
+            </p:sp>
+          </mc:Choice>
+          <mc:Fallback>
+            <p:sp>
+              <p:nvSpPr>
+                <p:cNvPr id="27" name="TextBox 26">
+                  <a:extLst>
+                    <a:ext uri="{FF2B5EF4-FFF2-40B4-BE49-F238E27FC236}">
+                      <a16:creationId xmlns:a16="http://schemas.microsoft.com/office/drawing/2014/main" id="{63F61B4C-5856-47ED-9520-DDF831B132CF}"/>
+                    </a:ext>
+                  </a:extLst>
+                </p:cNvPr>
+                <p:cNvSpPr txBox="1">
+                  <a:spLocks noRot="1" noChangeAspect="1" noMove="1" noResize="1" noEditPoints="1" noAdjustHandles="1" noChangeArrowheads="1" noChangeShapeType="1" noTextEdit="1"/>
+                </p:cNvSpPr>
+                <p:nvPr/>
+              </p:nvSpPr>
+              <p:spPr>
+                <a:xfrm>
+                  <a:off x="6443666" y="3615809"/>
+                  <a:ext cx="453021" cy="276999"/>
+                </a:xfrm>
+                <a:prstGeom prst="rect">
+                  <a:avLst/>
+                </a:prstGeom>
+                <a:blipFill>
+                  <a:blip r:embed="rId5"/>
+                  <a:stretch>
+                    <a:fillRect b="-15217"/>
+                  </a:stretch>
+                </a:blipFill>
+              </p:spPr>
+              <p:txBody>
+                <a:bodyPr/>
+                <a:lstStyle/>
+                <a:p>
+                  <a:r>
+                    <a:rPr lang="en-US">
+                      <a:noFill/>
+                    </a:rPr>
+                    <a:t> </a:t>
+                  </a:r>
+                </a:p>
+              </p:txBody>
+            </p:sp>
+          </mc:Fallback>
+        </mc:AlternateContent>
+        <mc:AlternateContent xmlns:mc="http://schemas.openxmlformats.org/markup-compatibility/2006">
+          <mc:Choice xmlns:a14="http://schemas.microsoft.com/office/drawing/2010/main" Requires="a14">
+            <p:sp>
+              <p:nvSpPr>
+                <p:cNvPr id="42" name="TextBox 41">
+                  <a:extLst>
+                    <a:ext uri="{FF2B5EF4-FFF2-40B4-BE49-F238E27FC236}">
+                      <a16:creationId xmlns:a16="http://schemas.microsoft.com/office/drawing/2014/main" id="{3105223A-063F-4FD2-A819-387DE6960FAC}"/>
+                    </a:ext>
+                  </a:extLst>
+                </p:cNvPr>
+                <p:cNvSpPr txBox="1"/>
+                <p:nvPr/>
+              </p:nvSpPr>
+              <p:spPr>
+                <a:xfrm>
+                  <a:off x="4468890" y="4158313"/>
+                  <a:ext cx="453021" cy="276999"/>
+                </a:xfrm>
+                <a:prstGeom prst="rect">
+                  <a:avLst/>
+                </a:prstGeom>
+                <a:noFill/>
+              </p:spPr>
+              <p:txBody>
+                <a:bodyPr wrap="square" lIns="0" tIns="0" rIns="0" bIns="0" rtlCol="0">
+                  <a:spAutoFit/>
+                </a:bodyPr>
+                <a:lstStyle/>
+                <a:p>
+                  <a:pPr/>
+                  <a14:m>
+                    <m:oMathPara xmlns:m="http://schemas.openxmlformats.org/officeDocument/2006/math">
+                      <m:oMathParaPr>
+                        <m:jc m:val="centerGroup"/>
+                      </m:oMathParaPr>
+                      <m:oMath xmlns:m="http://schemas.openxmlformats.org/officeDocument/2006/math">
+                        <m:sSub>
+                          <m:sSubPr>
+                            <m:ctrlPr>
+                              <a:rPr lang="nb-NO" b="0" i="1" smtClean="0">
+                                <a:latin typeface="Cambria Math" panose="02040503050406030204" pitchFamily="18" charset="0"/>
+                              </a:rPr>
+                            </m:ctrlPr>
+                          </m:sSubPr>
+                          <m:e>
+                            <m:r>
+                              <a:rPr lang="nb-NO" b="0" i="1" smtClean="0">
+                                <a:latin typeface="Cambria Math" panose="02040503050406030204" pitchFamily="18" charset="0"/>
+                              </a:rPr>
+                              <m:t>𝑥</m:t>
+                            </m:r>
+                          </m:e>
+                          <m:sub>
+                            <m:r>
+                              <a:rPr lang="en-US" b="0" i="1" smtClean="0">
+                                <a:latin typeface="Cambria Math" panose="02040503050406030204" pitchFamily="18" charset="0"/>
+                              </a:rPr>
+                              <m:t>3</m:t>
+                            </m:r>
+                          </m:sub>
+                        </m:sSub>
+                      </m:oMath>
+                    </m:oMathPara>
+                  </a14:m>
+                  <a:endParaRPr lang="en-US" dirty="0"/>
+                </a:p>
+              </p:txBody>
+            </p:sp>
+          </mc:Choice>
+          <mc:Fallback>
+            <p:sp>
+              <p:nvSpPr>
+                <p:cNvPr id="42" name="TextBox 41">
+                  <a:extLst>
+                    <a:ext uri="{FF2B5EF4-FFF2-40B4-BE49-F238E27FC236}">
+                      <a16:creationId xmlns:a16="http://schemas.microsoft.com/office/drawing/2014/main" id="{3105223A-063F-4FD2-A819-387DE6960FAC}"/>
+                    </a:ext>
+                  </a:extLst>
+                </p:cNvPr>
+                <p:cNvSpPr txBox="1">
+                  <a:spLocks noRot="1" noChangeAspect="1" noMove="1" noResize="1" noEditPoints="1" noAdjustHandles="1" noChangeArrowheads="1" noChangeShapeType="1" noTextEdit="1"/>
+                </p:cNvSpPr>
+                <p:nvPr/>
+              </p:nvSpPr>
+              <p:spPr>
+                <a:xfrm>
+                  <a:off x="4468890" y="4158313"/>
+                  <a:ext cx="453021" cy="276999"/>
+                </a:xfrm>
+                <a:prstGeom prst="rect">
+                  <a:avLst/>
+                </a:prstGeom>
+                <a:blipFill>
+                  <a:blip r:embed="rId6"/>
+                  <a:stretch>
+                    <a:fillRect b="-15217"/>
+                  </a:stretch>
+                </a:blipFill>
+              </p:spPr>
+              <p:txBody>
+                <a:bodyPr/>
+                <a:lstStyle/>
+                <a:p>
+                  <a:r>
+                    <a:rPr lang="en-US">
+                      <a:noFill/>
+                    </a:rPr>
+                    <a:t> </a:t>
+                  </a:r>
+                </a:p>
+              </p:txBody>
+            </p:sp>
+          </mc:Fallback>
+        </mc:AlternateContent>
+        <p:cxnSp>
+          <p:nvCxnSpPr>
+            <p:cNvPr id="43" name="Straight Connector 42">
+              <a:extLst>
+                <a:ext uri="{FF2B5EF4-FFF2-40B4-BE49-F238E27FC236}">
+                  <a16:creationId xmlns:a16="http://schemas.microsoft.com/office/drawing/2014/main" id="{B665315C-D0C7-49DC-BC89-0E26639AA82C}"/>
+                </a:ext>
+              </a:extLst>
+            </p:cNvPr>
+            <p:cNvCxnSpPr>
+              <a:cxnSpLocks/>
+            </p:cNvCxnSpPr>
+            <p:nvPr/>
+          </p:nvCxnSpPr>
+          <p:spPr>
+            <a:xfrm>
+              <a:off x="4684515" y="3349618"/>
+              <a:ext cx="0" cy="900184"/>
+            </a:xfrm>
+            <a:prstGeom prst="line">
+              <a:avLst/>
+            </a:prstGeom>
+            <a:ln w="19050">
+              <a:solidFill>
+                <a:schemeClr val="tx1"/>
+              </a:solidFill>
+              <a:prstDash val="dash"/>
+            </a:ln>
+          </p:spPr>
+          <p:style>
+            <a:lnRef idx="1">
+              <a:schemeClr val="accent1"/>
+            </a:lnRef>
+            <a:fillRef idx="0">
+              <a:schemeClr val="accent1"/>
+            </a:fillRef>
+            <a:effectRef idx="0">
+              <a:schemeClr val="accent1"/>
+            </a:effectRef>
+            <a:fontRef idx="minor">
+              <a:schemeClr val="tx1"/>
+            </a:fontRef>
+          </p:style>
+        </p:cxnSp>
+      </p:grpSp>
+    </p:spTree>
+    <p:extLst>
+      <p:ext uri="{BB962C8B-B14F-4D97-AF65-F5344CB8AC3E}">
+        <p14:creationId xmlns:p14="http://schemas.microsoft.com/office/powerpoint/2010/main" val="4013747328"/>
+      </p:ext>
+    </p:extLst>
+  </p:cSld>
+  <p:clrMapOvr>
+    <a:masterClrMapping/>
+  </p:clrMapOvr>
+</p:sld>
+</file>
+
+<file path=ppt/slides/slide4.xml><?xml version="1.0" encoding="utf-8"?>
+<p:sld xmlns:a="http://schemas.openxmlformats.org/drawingml/2006/main" xmlns:r="http://schemas.openxmlformats.org/officeDocument/2006/relationships" xmlns:p="http://schemas.openxmlformats.org/presentationml/2006/main">
+  <p:cSld>
+    <p:spTree>
+      <p:nvGrpSpPr>
+        <p:cNvPr id="1" name=""/>
+        <p:cNvGrpSpPr/>
+        <p:nvPr/>
+      </p:nvGrpSpPr>
+      <p:grpSpPr>
+        <a:xfrm>
+          <a:off x="0" y="0"/>
+          <a:ext cx="0" cy="0"/>
+          <a:chOff x="0" y="0"/>
+          <a:chExt cx="0" cy="0"/>
+        </a:xfrm>
+      </p:grpSpPr>
+      <p:grpSp>
+        <p:nvGrpSpPr>
           <p:cNvPr id="56" name="Group 55">
             <a:extLst>
               <a:ext uri="{FF2B5EF4-FFF2-40B4-BE49-F238E27FC236}">
@@ -5235,7 +6427,7 @@
 </p:sld>
 </file>
 
-<file path=ppt/slides/slide4.xml><?xml version="1.0" encoding="utf-8"?>
+<file path=ppt/slides/slide5.xml><?xml version="1.0" encoding="utf-8"?>
 <p:sld xmlns:a="http://schemas.openxmlformats.org/drawingml/2006/main" xmlns:r="http://schemas.openxmlformats.org/officeDocument/2006/relationships" xmlns:p="http://schemas.openxmlformats.org/presentationml/2006/main">
   <p:cSld>
     <p:spTree>
@@ -7135,7 +8327,7 @@
 </p:sld>
 </file>
 
-<file path=ppt/slides/slide5.xml><?xml version="1.0" encoding="utf-8"?>
+<file path=ppt/slides/slide6.xml><?xml version="1.0" encoding="utf-8"?>
 <p:sld xmlns:a="http://schemas.openxmlformats.org/drawingml/2006/main" xmlns:r="http://schemas.openxmlformats.org/officeDocument/2006/relationships" xmlns:p="http://schemas.openxmlformats.org/presentationml/2006/main">
   <p:cSld>
     <p:spTree>
@@ -8557,7 +9749,7 @@
 </p:sld>
 </file>
 
-<file path=ppt/slides/slide6.xml><?xml version="1.0" encoding="utf-8"?>
+<file path=ppt/slides/slide7.xml><?xml version="1.0" encoding="utf-8"?>
 <p:sld xmlns:a="http://schemas.openxmlformats.org/drawingml/2006/main" xmlns:r="http://schemas.openxmlformats.org/officeDocument/2006/relationships" xmlns:p="http://schemas.openxmlformats.org/presentationml/2006/main">
   <p:cSld>
     <p:spTree>
@@ -8668,7 +9860,7 @@
 </p:sld>
 </file>
 
-<file path=ppt/slides/slide7.xml><?xml version="1.0" encoding="utf-8"?>
+<file path=ppt/slides/slide8.xml><?xml version="1.0" encoding="utf-8"?>
 <p:sld xmlns:a="http://schemas.openxmlformats.org/drawingml/2006/main" xmlns:r="http://schemas.openxmlformats.org/officeDocument/2006/relationships" xmlns:p="http://schemas.openxmlformats.org/presentationml/2006/main">
   <p:cSld>
     <p:spTree>
@@ -10670,7 +11862,7 @@
 </p:sld>
 </file>
 
-<file path=ppt/slides/slide8.xml><?xml version="1.0" encoding="utf-8"?>
+<file path=ppt/slides/slide9.xml><?xml version="1.0" encoding="utf-8"?>
 <p:sld xmlns:a="http://schemas.openxmlformats.org/drawingml/2006/main" xmlns:r="http://schemas.openxmlformats.org/officeDocument/2006/relationships" xmlns:p="http://schemas.openxmlformats.org/presentationml/2006/main">
   <p:cSld>
     <p:spTree>
@@ -12424,8 +13616,8 @@
             </a:fontRef>
           </p:style>
         </p:cxnSp>
-        <mc:AlternateContent xmlns:mc="http://schemas.openxmlformats.org/markup-compatibility/2006">
-          <mc:Choice xmlns:a14="http://schemas.microsoft.com/office/drawing/2010/main" Requires="a14">
+        <mc:AlternateContent xmlns:mc="http://schemas.openxmlformats.org/markup-compatibility/2006" xmlns:a14="http://schemas.microsoft.com/office/drawing/2010/main">
+          <mc:Choice Requires="a14">
             <p:sp>
               <p:nvSpPr>
                 <p:cNvPr id="62" name="TextBox 61">
@@ -12454,6 +13646,7 @@
                 </a:bodyPr>
                 <a:lstStyle/>
                 <a:p>
+                  <a:pPr/>
                   <a14:m>
                     <m:oMathPara xmlns:m="http://schemas.openxmlformats.org/officeDocument/2006/math">
                       <m:oMathParaPr>
@@ -12504,7 +13697,7 @@
               </p:txBody>
             </p:sp>
           </mc:Choice>
-          <mc:Fallback>
+          <mc:Fallback xmlns="">
             <p:sp>
               <p:nvSpPr>
                 <p:cNvPr id="62" name="TextBox 61">
@@ -12631,8 +13824,8 @@
             </a:fontRef>
           </p:style>
         </p:cxnSp>
-        <mc:AlternateContent xmlns:mc="http://schemas.openxmlformats.org/markup-compatibility/2006">
-          <mc:Choice xmlns:a14="http://schemas.microsoft.com/office/drawing/2010/main" Requires="a14">
+        <mc:AlternateContent xmlns:mc="http://schemas.openxmlformats.org/markup-compatibility/2006" xmlns:a14="http://schemas.microsoft.com/office/drawing/2010/main">
+          <mc:Choice Requires="a14">
             <p:sp>
               <p:nvSpPr>
                 <p:cNvPr id="70" name="Rectangle 69">
@@ -12660,6 +13853,7 @@
                 </a:bodyPr>
                 <a:lstStyle/>
                 <a:p>
+                  <a:pPr/>
                   <a14:m>
                     <m:oMathPara xmlns:m="http://schemas.openxmlformats.org/officeDocument/2006/math">
                       <m:oMathParaPr>
@@ -12680,7 +13874,7 @@
               </p:txBody>
             </p:sp>
           </mc:Choice>
-          <mc:Fallback>
+          <mc:Fallback xmlns="">
             <p:sp>
               <p:nvSpPr>
                 <p:cNvPr id="70" name="Rectangle 69">
@@ -12725,8 +13919,8 @@
             </p:sp>
           </mc:Fallback>
         </mc:AlternateContent>
-        <mc:AlternateContent xmlns:mc="http://schemas.openxmlformats.org/markup-compatibility/2006">
-          <mc:Choice xmlns:a14="http://schemas.microsoft.com/office/drawing/2010/main" Requires="a14">
+        <mc:AlternateContent xmlns:mc="http://schemas.openxmlformats.org/markup-compatibility/2006" xmlns:a14="http://schemas.microsoft.com/office/drawing/2010/main">
+          <mc:Choice Requires="a14">
             <p:sp>
               <p:nvSpPr>
                 <p:cNvPr id="71" name="Rectangle 70">
@@ -12754,6 +13948,7 @@
                 </a:bodyPr>
                 <a:lstStyle/>
                 <a:p>
+                  <a:pPr/>
                   <a14:m>
                     <m:oMathPara xmlns:m="http://schemas.openxmlformats.org/officeDocument/2006/math">
                       <m:oMathParaPr>
@@ -12774,7 +13969,7 @@
               </p:txBody>
             </p:sp>
           </mc:Choice>
-          <mc:Fallback>
+          <mc:Fallback xmlns="">
             <p:sp>
               <p:nvSpPr>
                 <p:cNvPr id="71" name="Rectangle 70">

</xml_diff>